<commit_message>
Update ESC - Sistema de Gerenciamento de Hoteis.pptx
</commit_message>
<xml_diff>
--- a/ESC - Sistema de Gerenciamento de Hoteis.pptx
+++ b/ESC - Sistema de Gerenciamento de Hoteis.pptx
@@ -10,6 +10,7 @@
     <p:sldId id="263" r:id="rId4"/>
     <p:sldId id="261" r:id="rId5"/>
     <p:sldId id="262" r:id="rId6"/>
+    <p:sldId id="264" r:id="rId7"/>
   </p:sldIdLst>
   <p:sldSz cx="12192000" cy="6858000"/>
   <p:notesSz cx="6858000" cy="9144000"/>
@@ -14186,6 +14187,113 @@
 </p:sld>
 </file>
 
+<file path=ppt/slides/slide6.xml><?xml version="1.0" encoding="utf-8"?>
+<p:sld xmlns:a="http://schemas.openxmlformats.org/drawingml/2006/main" xmlns:r="http://schemas.openxmlformats.org/officeDocument/2006/relationships" xmlns:p="http://schemas.openxmlformats.org/presentationml/2006/main">
+  <p:cSld>
+    <p:spTree>
+      <p:nvGrpSpPr>
+        <p:cNvPr id="1" name=""/>
+        <p:cNvGrpSpPr/>
+        <p:nvPr/>
+      </p:nvGrpSpPr>
+      <p:grpSpPr>
+        <a:xfrm>
+          <a:off x="0" y="0"/>
+          <a:ext cx="0" cy="0"/>
+          <a:chOff x="0" y="0"/>
+          <a:chExt cx="0" cy="0"/>
+        </a:xfrm>
+      </p:grpSpPr>
+      <p:sp>
+        <p:nvSpPr>
+          <p:cNvPr id="2" name="Título 1">
+            <a:extLst>
+              <a:ext uri="{FF2B5EF4-FFF2-40B4-BE49-F238E27FC236}">
+                <a16:creationId xmlns:a16="http://schemas.microsoft.com/office/drawing/2014/main" id="{90D7A43A-3EFE-5E36-C0F5-7C14CC0F3823}"/>
+              </a:ext>
+            </a:extLst>
+          </p:cNvPr>
+          <p:cNvSpPr>
+            <a:spLocks noGrp="1"/>
+          </p:cNvSpPr>
+          <p:nvPr>
+            <p:ph type="title"/>
+          </p:nvPr>
+        </p:nvSpPr>
+        <p:spPr/>
+        <p:txBody>
+          <a:bodyPr/>
+          <a:lstStyle/>
+          <a:p>
+            <a:r>
+              <a:rPr lang="pt-BR" dirty="0"/>
+              <a:t>Diagramas</a:t>
+            </a:r>
+          </a:p>
+        </p:txBody>
+      </p:sp>
+      <p:sp>
+        <p:nvSpPr>
+          <p:cNvPr id="3" name="Espaço Reservado para Conteúdo 2">
+            <a:extLst>
+              <a:ext uri="{FF2B5EF4-FFF2-40B4-BE49-F238E27FC236}">
+                <a16:creationId xmlns:a16="http://schemas.microsoft.com/office/drawing/2014/main" id="{BE0AE145-7637-7892-B91A-04F954C5F6FC}"/>
+              </a:ext>
+            </a:extLst>
+          </p:cNvPr>
+          <p:cNvSpPr>
+            <a:spLocks noGrp="1"/>
+          </p:cNvSpPr>
+          <p:nvPr>
+            <p:ph idx="1"/>
+          </p:nvPr>
+        </p:nvSpPr>
+        <p:spPr/>
+        <p:txBody>
+          <a:bodyPr>
+            <a:normAutofit/>
+          </a:bodyPr>
+          <a:lstStyle/>
+          <a:p>
+            <a:pPr marL="0" lvl="0" indent="0" algn="just">
+              <a:lnSpc>
+                <a:spcPct val="150000"/>
+              </a:lnSpc>
+              <a:buNone/>
+            </a:pPr>
+            <a:r>
+              <a:rPr lang="pt-BR" sz="1800" dirty="0">
+                <a:latin typeface="Arial" panose="020B0604020202020204" pitchFamily="34" charset="0"/>
+                <a:ea typeface="Calibri" panose="020F0502020204030204" pitchFamily="34" charset="0"/>
+                <a:cs typeface="Arial" panose="020B0604020202020204" pitchFamily="34" charset="0"/>
+              </a:rPr>
+              <a:t>d</a:t>
+            </a:r>
+            <a:endParaRPr lang="pt-BR" sz="1800" dirty="0">
+              <a:effectLst/>
+              <a:latin typeface="Arial" panose="020B0604020202020204" pitchFamily="34" charset="0"/>
+              <a:ea typeface="Calibri" panose="020F0502020204030204" pitchFamily="34" charset="0"/>
+              <a:cs typeface="Arial" panose="020B0604020202020204" pitchFamily="34" charset="0"/>
+            </a:endParaRPr>
+          </a:p>
+          <a:p>
+            <a:endParaRPr lang="pt-BR" dirty="0"/>
+          </a:p>
+        </p:txBody>
+      </p:sp>
+    </p:spTree>
+    <p:extLst>
+      <p:ext uri="{BB962C8B-B14F-4D97-AF65-F5344CB8AC3E}">
+        <p14:creationId xmlns:p14="http://schemas.microsoft.com/office/powerpoint/2010/main" val="1658231372"/>
+      </p:ext>
+    </p:extLst>
+  </p:cSld>
+  <p:clrMapOvr>
+    <a:masterClrMapping/>
+  </p:clrMapOvr>
+</p:sld>
+</file>
+
 <file path=ppt/theme/theme1.xml><?xml version="1.0" encoding="utf-8"?>
 <a:theme xmlns:a="http://schemas.openxmlformats.org/drawingml/2006/main" name="Circuito">
   <a:themeElements>

</xml_diff>